<commit_message>
Update Group 23_presentation(1)_not complete.pptx
</commit_message>
<xml_diff>
--- a/Powerpoint/Group 23_presentation(1)_not complete.pptx
+++ b/Powerpoint/Group 23_presentation(1)_not complete.pptx
@@ -8050,7 +8050,7 @@
                 <a:blip r:embed="rId2">
                   <a:extLst>
                     <a:ext uri="{96DAC541-7B7A-43D3-8B79-37D633B846F1}">
-                      <asvg:svgBlip xmlns:asvg="http://schemas.microsoft.com/office/drawing/2016/SVG/main" xmlns="" r:embed="rId3"/>
+                      <asvg:svgBlip xmlns="" xmlns:asvg="http://schemas.microsoft.com/office/drawing/2016/SVG/main" r:embed="rId3"/>
                     </a:ext>
                   </a:extLst>
                 </a:blip>
@@ -8067,7 +8067,7 @@
                 <a:blip r:embed="rId2">
                   <a:extLst>
                     <a:ext uri="{96DAC541-7B7A-43D3-8B79-37D633B846F1}">
-                      <asvg:svgBlip xmlns:asvg="http://schemas.microsoft.com/office/drawing/2016/SVG/main" xmlns="" r:embed="rId3"/>
+                      <asvg:svgBlip xmlns="" xmlns:asvg="http://schemas.microsoft.com/office/drawing/2016/SVG/main" r:embed="rId3"/>
                     </a:ext>
                   </a:extLst>
                 </a:blip>
@@ -8084,7 +8084,7 @@
                 <a:blip r:embed="rId2">
                   <a:extLst>
                     <a:ext uri="{96DAC541-7B7A-43D3-8B79-37D633B846F1}">
-                      <asvg:svgBlip xmlns:asvg="http://schemas.microsoft.com/office/drawing/2016/SVG/main" xmlns="" r:embed="rId3"/>
+                      <asvg:svgBlip xmlns="" xmlns:asvg="http://schemas.microsoft.com/office/drawing/2016/SVG/main" r:embed="rId3"/>
                     </a:ext>
                   </a:extLst>
                 </a:blip>
@@ -8101,7 +8101,7 @@
                 <a:blip r:embed="rId2">
                   <a:extLst>
                     <a:ext uri="{96DAC541-7B7A-43D3-8B79-37D633B846F1}">
-                      <asvg:svgBlip xmlns:asvg="http://schemas.microsoft.com/office/drawing/2016/SVG/main" xmlns="" r:embed="rId3"/>
+                      <asvg:svgBlip xmlns="" xmlns:asvg="http://schemas.microsoft.com/office/drawing/2016/SVG/main" r:embed="rId3"/>
                     </a:ext>
                   </a:extLst>
                 </a:blip>
@@ -8118,7 +8118,7 @@
                 <a:blip r:embed="rId2">
                   <a:extLst>
                     <a:ext uri="{96DAC541-7B7A-43D3-8B79-37D633B846F1}">
-                      <asvg:svgBlip xmlns:asvg="http://schemas.microsoft.com/office/drawing/2016/SVG/main" xmlns="" r:embed="rId3"/>
+                      <asvg:svgBlip xmlns="" xmlns:asvg="http://schemas.microsoft.com/office/drawing/2016/SVG/main" r:embed="rId3"/>
                     </a:ext>
                   </a:extLst>
                 </a:blip>

</xml_diff>

<commit_message>
Updated names on presentation
</commit_message>
<xml_diff>
--- a/Powerpoint/Group 23_presentation(1)_not complete.pptx
+++ b/Powerpoint/Group 23_presentation(1)_not complete.pptx
@@ -7751,8 +7751,8 @@
               <a:t>Tomas </a:t>
             </a:r>
             <a:r>
-              <a:rPr lang="en-US" dirty="0" err="1"/>
-              <a:t>Prybl</a:t>
+              <a:rPr lang="en-US" smtClean="0"/>
+              <a:t>Pribyl</a:t>
             </a:r>
             <a:endParaRPr lang="en-US" dirty="0"/>
           </a:p>
@@ -8052,7 +8052,7 @@
                 <a:blip r:embed="rId2">
                   <a:extLst>
                     <a:ext uri="{96DAC541-7B7A-43D3-8B79-37D633B846F1}">
-                      <asvg:svgBlip xmlns:asvg="http://schemas.microsoft.com/office/drawing/2016/SVG/main" xmlns="" r:embed="rId3"/>
+                      <asvg:svgBlip xmlns="" xmlns:asvg="http://schemas.microsoft.com/office/drawing/2016/SVG/main" r:embed="rId3"/>
                     </a:ext>
                   </a:extLst>
                 </a:blip>
@@ -8069,7 +8069,7 @@
                 <a:blip r:embed="rId2">
                   <a:extLst>
                     <a:ext uri="{96DAC541-7B7A-43D3-8B79-37D633B846F1}">
-                      <asvg:svgBlip xmlns:asvg="http://schemas.microsoft.com/office/drawing/2016/SVG/main" xmlns="" r:embed="rId3"/>
+                      <asvg:svgBlip xmlns="" xmlns:asvg="http://schemas.microsoft.com/office/drawing/2016/SVG/main" r:embed="rId3"/>
                     </a:ext>
                   </a:extLst>
                 </a:blip>
@@ -8086,7 +8086,7 @@
                 <a:blip r:embed="rId2">
                   <a:extLst>
                     <a:ext uri="{96DAC541-7B7A-43D3-8B79-37D633B846F1}">
-                      <asvg:svgBlip xmlns:asvg="http://schemas.microsoft.com/office/drawing/2016/SVG/main" xmlns="" r:embed="rId3"/>
+                      <asvg:svgBlip xmlns="" xmlns:asvg="http://schemas.microsoft.com/office/drawing/2016/SVG/main" r:embed="rId3"/>
                     </a:ext>
                   </a:extLst>
                 </a:blip>
@@ -8103,7 +8103,7 @@
                 <a:blip r:embed="rId2">
                   <a:extLst>
                     <a:ext uri="{96DAC541-7B7A-43D3-8B79-37D633B846F1}">
-                      <asvg:svgBlip xmlns:asvg="http://schemas.microsoft.com/office/drawing/2016/SVG/main" xmlns="" r:embed="rId3"/>
+                      <asvg:svgBlip xmlns="" xmlns:asvg="http://schemas.microsoft.com/office/drawing/2016/SVG/main" r:embed="rId3"/>
                     </a:ext>
                   </a:extLst>
                 </a:blip>
@@ -8120,7 +8120,7 @@
                 <a:blip r:embed="rId2">
                   <a:extLst>
                     <a:ext uri="{96DAC541-7B7A-43D3-8B79-37D633B846F1}">
-                      <asvg:svgBlip xmlns:asvg="http://schemas.microsoft.com/office/drawing/2016/SVG/main" xmlns="" r:embed="rId3"/>
+                      <asvg:svgBlip xmlns="" xmlns:asvg="http://schemas.microsoft.com/office/drawing/2016/SVG/main" r:embed="rId3"/>
                     </a:ext>
                   </a:extLst>
                 </a:blip>

</xml_diff>